<commit_message>
minor changes in bidding
</commit_message>
<xml_diff>
--- a/docs/Docs/FYP Defense PPT.pptx
+++ b/docs/Docs/FYP Defense PPT.pptx
@@ -246,7 +246,7 @@
           <a:p>
             <a:fld id="{F352A77B-D33C-49B3-A83C-450AA2ED72B3}" type="datetimeFigureOut">
               <a:rPr lang="en-US" smtClean="0"/>
-              <a:t>11/30/2022</a:t>
+              <a:t>4/17/2023</a:t>
             </a:fld>
             <a:endParaRPr lang="en-US" dirty="0"/>
           </a:p>
@@ -423,7 +423,7 @@
           <a:p>
             <a:fld id="{E38D8F9A-F5CB-4EF8-A859-ED5E107B9763}" type="datetimeFigureOut">
               <a:rPr lang="en-US" smtClean="0"/>
-              <a:t>11/30/2022</a:t>
+              <a:t>4/17/2023</a:t>
             </a:fld>
             <a:endParaRPr lang="en-US" dirty="0"/>
           </a:p>
@@ -17481,11 +17481,9 @@
               <a:buChar char="•"/>
             </a:pPr>
             <a:r>
-              <a:rPr lang="en-US" sz="2800" b="1" dirty="0">
-                <a:solidFill>
-                  <a:schemeClr val="accent6">
-                    <a:lumMod val="75000"/>
-                  </a:schemeClr>
+              <a:rPr lang="en-US" sz="2800" dirty="0">
+                <a:solidFill>
+                  <a:schemeClr val="accent6"/>
                 </a:solidFill>
               </a:rPr>
               <a:t>Freelancer registration / Verification system</a:t>
@@ -17497,11 +17495,9 @@
               <a:buChar char="•"/>
             </a:pPr>
             <a:r>
-              <a:rPr lang="en-US" sz="2800" b="1" dirty="0">
-                <a:solidFill>
-                  <a:schemeClr val="accent6">
-                    <a:lumMod val="75000"/>
-                  </a:schemeClr>
+              <a:rPr lang="en-US" sz="2800" dirty="0">
+                <a:solidFill>
+                  <a:schemeClr val="accent6"/>
                 </a:solidFill>
               </a:rPr>
               <a:t>Profile dashboard</a:t>
@@ -17513,7 +17509,11 @@
               <a:buChar char="•"/>
             </a:pPr>
             <a:r>
-              <a:rPr lang="en-US" sz="2800" dirty="0"/>
+              <a:rPr lang="en-US" sz="2800" dirty="0">
+                <a:solidFill>
+                  <a:schemeClr val="accent6"/>
+                </a:solidFill>
+              </a:rPr>
               <a:t>Project creation / Posting</a:t>
             </a:r>
           </a:p>
@@ -17523,7 +17523,11 @@
               <a:buChar char="•"/>
             </a:pPr>
             <a:r>
-              <a:rPr lang="en-US" sz="2800" dirty="0"/>
+              <a:rPr lang="en-US" sz="2800" dirty="0">
+                <a:solidFill>
+                  <a:schemeClr val="accent6"/>
+                </a:solidFill>
+              </a:rPr>
               <a:t>Order management</a:t>
             </a:r>
           </a:p>
@@ -17533,7 +17537,11 @@
               <a:buChar char="•"/>
             </a:pPr>
             <a:r>
-              <a:rPr lang="en-US" sz="2800" dirty="0"/>
+              <a:rPr lang="en-US" sz="2800" dirty="0">
+                <a:solidFill>
+                  <a:schemeClr val="accent6"/>
+                </a:solidFill>
+              </a:rPr>
               <a:t>Buyer requests</a:t>
             </a:r>
           </a:p>
@@ -17543,7 +17551,11 @@
               <a:buChar char="•"/>
             </a:pPr>
             <a:r>
-              <a:rPr lang="en-US" sz="2800" dirty="0"/>
+              <a:rPr lang="en-US" sz="2800" dirty="0">
+                <a:solidFill>
+                  <a:schemeClr val="accent6"/>
+                </a:solidFill>
+              </a:rPr>
               <a:t>Search system</a:t>
             </a:r>
           </a:p>
@@ -17754,7 +17766,11 @@
               <a:buChar char="•"/>
             </a:pPr>
             <a:r>
-              <a:rPr lang="en-US" sz="2800" dirty="0"/>
+              <a:rPr lang="en-US" sz="2800" dirty="0">
+                <a:solidFill>
+                  <a:schemeClr val="accent6"/>
+                </a:solidFill>
+              </a:rPr>
               <a:t>Bidding system</a:t>
             </a:r>
           </a:p>
@@ -17764,7 +17780,11 @@
               <a:buChar char="•"/>
             </a:pPr>
             <a:r>
-              <a:rPr lang="en-US" sz="2800" dirty="0"/>
+              <a:rPr lang="en-US" sz="2800" dirty="0">
+                <a:solidFill>
+                  <a:schemeClr val="accent6"/>
+                </a:solidFill>
+              </a:rPr>
               <a:t>Push notification system</a:t>
             </a:r>
           </a:p>
@@ -17774,8 +17794,12 @@
               <a:buChar char="•"/>
             </a:pPr>
             <a:r>
-              <a:rPr lang="en-US" sz="2800" dirty="0"/>
-              <a:t>Custom offers</a:t>
+              <a:rPr lang="en-US" sz="2800" dirty="0">
+                <a:solidFill>
+                  <a:schemeClr val="accent6"/>
+                </a:solidFill>
+              </a:rPr>
+              <a:t>Chat system</a:t>
             </a:r>
           </a:p>
           <a:p>
@@ -17785,7 +17809,7 @@
             </a:pPr>
             <a:r>
               <a:rPr lang="en-US" sz="2800" dirty="0"/>
-              <a:t>Chat system</a:t>
+              <a:t>Custom offers</a:t>
             </a:r>
           </a:p>
           <a:p>
@@ -19422,15 +19446,6 @@
 </file>
 
 <file path=customXml/item1.xml><?xml version="1.0" encoding="utf-8"?>
-<?mso-contentType ?>
-<FormTemplates xmlns="http://schemas.microsoft.com/sharepoint/v3/contenttype/forms">
-  <Display>DocumentLibraryForm</Display>
-  <Edit>DocumentLibraryForm</Edit>
-  <New>DocumentLibraryForm</New>
-</FormTemplates>
-</file>
-
-<file path=customXml/item2.xml><?xml version="1.0" encoding="utf-8"?>
 <p:properties xmlns:p="http://schemas.microsoft.com/office/2006/metadata/properties" xmlns:xsi="http://www.w3.org/2001/XMLSchema-instance" xmlns:pc="http://schemas.microsoft.com/office/infopath/2007/PartnerControls">
   <documentManagement>
     <_ip_UnifiedCompliancePolicyUIAction xmlns="http://schemas.microsoft.com/sharepoint/v3" xsi:nil="true"/>
@@ -19447,6 +19462,15 @@
     <MediaServiceKeyPoints xmlns="71af3243-3dd4-4a8d-8c0d-dd76da1f02a5" xsi:nil="true"/>
   </documentManagement>
 </p:properties>
+</file>
+
+<file path=customXml/item2.xml><?xml version="1.0" encoding="utf-8"?>
+<?mso-contentType ?>
+<FormTemplates xmlns="http://schemas.microsoft.com/sharepoint/v3/contenttype/forms">
+  <Display>DocumentLibraryForm</Display>
+  <Edit>DocumentLibraryForm</Edit>
+  <New>DocumentLibraryForm</New>
+</FormTemplates>
 </file>
 
 <file path=customXml/item3.xml><?xml version="1.0" encoding="utf-8"?>
@@ -19726,14 +19750,6 @@
 </file>
 
 <file path=customXml/itemProps1.xml><?xml version="1.0" encoding="utf-8"?>
-<ds:datastoreItem xmlns:ds="http://schemas.openxmlformats.org/officeDocument/2006/customXml" ds:itemID="{42BC90D6-94CF-42F7-AAC4-9CF6824C54D5}">
-  <ds:schemaRefs>
-    <ds:schemaRef ds:uri="http://schemas.microsoft.com/sharepoint/v3/contenttype/forms"/>
-  </ds:schemaRefs>
-</ds:datastoreItem>
-</file>
-
-<file path=customXml/itemProps2.xml><?xml version="1.0" encoding="utf-8"?>
 <ds:datastoreItem xmlns:ds="http://schemas.openxmlformats.org/officeDocument/2006/customXml" ds:itemID="{7F97B18F-50BC-4F30-8373-93489E845F83}">
   <ds:schemaRefs>
     <ds:schemaRef ds:uri="http://schemas.microsoft.com/office/2006/metadata/properties"/>
@@ -19741,6 +19757,14 @@
     <ds:schemaRef ds:uri="http://schemas.microsoft.com/sharepoint/v3"/>
     <ds:schemaRef ds:uri="71af3243-3dd4-4a8d-8c0d-dd76da1f02a5"/>
     <ds:schemaRef ds:uri="230e9df3-be65-4c73-a93b-d1236ebd677e"/>
+  </ds:schemaRefs>
+</ds:datastoreItem>
+</file>
+
+<file path=customXml/itemProps2.xml><?xml version="1.0" encoding="utf-8"?>
+<ds:datastoreItem xmlns:ds="http://schemas.openxmlformats.org/officeDocument/2006/customXml" ds:itemID="{42BC90D6-94CF-42F7-AAC4-9CF6824C54D5}">
+  <ds:schemaRefs>
+    <ds:schemaRef ds:uri="http://schemas.microsoft.com/sharepoint/v3/contenttype/forms"/>
   </ds:schemaRefs>
 </ds:datastoreItem>
 </file>

</xml_diff>